<commit_message>
resize some text box
</commit_message>
<xml_diff>
--- a/PFE_power.pptx
+++ b/PFE_power.pptx
@@ -124,6 +124,10 @@
     </p:ext>
   </p:extLst>
 </p:presentation>
+</file>
+
+<file path=ppt/revisionInfo.xml><?xml version="1.0" encoding="utf-8"?>
+<p1510:revInfo xmlns:a="http://schemas.openxmlformats.org/drawingml/2006/main" xmlns:r="http://schemas.openxmlformats.org/officeDocument/2006/relationships" xmlns:p1510="http://schemas.microsoft.com/office/powerpoint/2015/10/main"/>
 </file>
 
 <file path=ppt/diagrams/colors1.xml><?xml version="1.0" encoding="utf-8"?>
@@ -1154,13 +1158,6 @@
         </dgm:presLayoutVars>
       </dgm:prSet>
       <dgm:spPr/>
-      <dgm:t>
-        <a:bodyPr/>
-        <a:lstStyle/>
-        <a:p>
-          <a:endParaRPr lang="en-US"/>
-        </a:p>
-      </dgm:t>
     </dgm:pt>
     <dgm:pt modelId="{43CA3DCE-6F9F-4291-8A40-F1D36DD9450C}" type="pres">
       <dgm:prSet presAssocID="{D47D05F2-DA36-478E-A9A1-3701A89912DD}" presName="gear1srcNode" presStyleLbl="node1" presStyleIdx="0" presStyleCnt="3"/>
@@ -1178,13 +1175,6 @@
         </dgm:presLayoutVars>
       </dgm:prSet>
       <dgm:spPr/>
-      <dgm:t>
-        <a:bodyPr/>
-        <a:lstStyle/>
-        <a:p>
-          <a:endParaRPr lang="en-US"/>
-        </a:p>
-      </dgm:t>
     </dgm:pt>
     <dgm:pt modelId="{DE6C823B-65ED-458E-A375-CB00069F1564}" type="pres">
       <dgm:prSet presAssocID="{0F6965FE-9BB4-431A-BE0B-E1A839F8F717}" presName="gear2srcNode" presStyleLbl="node1" presStyleIdx="1" presStyleCnt="3"/>
@@ -1197,13 +1187,6 @@
     <dgm:pt modelId="{5EED0E7C-099B-4868-9240-FECF04B4294E}" type="pres">
       <dgm:prSet presAssocID="{0A4ECFBD-868E-4F13-BCE9-1917C87FD509}" presName="gear3" presStyleLbl="node1" presStyleIdx="2" presStyleCnt="3"/>
       <dgm:spPr/>
-      <dgm:t>
-        <a:bodyPr/>
-        <a:lstStyle/>
-        <a:p>
-          <a:endParaRPr lang="en-US"/>
-        </a:p>
-      </dgm:t>
     </dgm:pt>
     <dgm:pt modelId="{1FAF9D3C-BFCA-441D-822C-8E6B5BDE5092}" type="pres">
       <dgm:prSet presAssocID="{0A4ECFBD-868E-4F13-BCE9-1917C87FD509}" presName="gear3tx" presStyleLbl="node1" presStyleIdx="2" presStyleCnt="3">
@@ -1213,13 +1196,6 @@
         </dgm:presLayoutVars>
       </dgm:prSet>
       <dgm:spPr/>
-      <dgm:t>
-        <a:bodyPr/>
-        <a:lstStyle/>
-        <a:p>
-          <a:endParaRPr lang="en-US"/>
-        </a:p>
-      </dgm:t>
     </dgm:pt>
     <dgm:pt modelId="{81250124-1105-45C5-9B3D-22B961712496}" type="pres">
       <dgm:prSet presAssocID="{0A4ECFBD-868E-4F13-BCE9-1917C87FD509}" presName="gear3srcNode" presStyleLbl="node1" presStyleIdx="2" presStyleCnt="3"/>
@@ -1244,22 +1220,22 @@
   </dgm:ptLst>
   <dgm:cxnLst>
     <dgm:cxn modelId="{D834F01A-CB88-4417-91BA-35552B19AF9D}" type="presOf" srcId="{0F6965FE-9BB4-431A-BE0B-E1A839F8F717}" destId="{0A3788FA-F59C-4733-8E1E-153F95EC33CC}" srcOrd="0" destOrd="0" presId="urn:microsoft.com/office/officeart/2005/8/layout/gear1"/>
+    <dgm:cxn modelId="{0AA2151C-08C2-4E45-9CBB-63CEC2384167}" type="presOf" srcId="{D47D05F2-DA36-478E-A9A1-3701A89912DD}" destId="{CB98C00C-856B-48DD-8E7E-D91BDD7A0F24}" srcOrd="2" destOrd="0" presId="urn:microsoft.com/office/officeart/2005/8/layout/gear1"/>
+    <dgm:cxn modelId="{76F40B60-0652-46AB-A6D9-76587CAD28E9}" type="presOf" srcId="{C5C003A9-4ABA-4F33-9E6A-E794CD1F1019}" destId="{B9858277-4211-4303-86C4-1454BBF67C46}" srcOrd="0" destOrd="0" presId="urn:microsoft.com/office/officeart/2005/8/layout/gear1"/>
+    <dgm:cxn modelId="{0579944B-CF2F-4884-8A20-E4B634341228}" type="presOf" srcId="{0A4ECFBD-868E-4F13-BCE9-1917C87FD509}" destId="{0211FE59-B92B-4DCF-AD08-E4D7DE58F6AD}" srcOrd="3" destOrd="0" presId="urn:microsoft.com/office/officeart/2005/8/layout/gear1"/>
+    <dgm:cxn modelId="{26987E6F-F99D-4167-9D64-4216E2398934}" type="presOf" srcId="{BF378784-AD6E-4D0A-A3F8-A2096D4A2404}" destId="{B7C9F66E-D2C6-46FE-A246-290F09749B65}" srcOrd="0" destOrd="0" presId="urn:microsoft.com/office/officeart/2005/8/layout/gear1"/>
+    <dgm:cxn modelId="{011ED273-3EC5-49CC-AB48-C6099173D8BA}" type="presOf" srcId="{0A4ECFBD-868E-4F13-BCE9-1917C87FD509}" destId="{1FAF9D3C-BFCA-441D-822C-8E6B5BDE5092}" srcOrd="1" destOrd="0" presId="urn:microsoft.com/office/officeart/2005/8/layout/gear1"/>
     <dgm:cxn modelId="{64F90B58-8822-4C5D-84F6-C446C40789B1}" srcId="{BF378784-AD6E-4D0A-A3F8-A2096D4A2404}" destId="{D47D05F2-DA36-478E-A9A1-3701A89912DD}" srcOrd="0" destOrd="0" parTransId="{7BBF75AD-F38C-4F39-A41E-FCCF826F5F5E}" sibTransId="{C22A580B-E437-4732-8E1B-8672F73544C9}"/>
+    <dgm:cxn modelId="{27BB837C-8489-4FB8-825C-2E124668F355}" type="presOf" srcId="{0A4ECFBD-868E-4F13-BCE9-1917C87FD509}" destId="{81250124-1105-45C5-9B3D-22B961712496}" srcOrd="2" destOrd="0" presId="urn:microsoft.com/office/officeart/2005/8/layout/gear1"/>
+    <dgm:cxn modelId="{D5FFAC87-14C6-47B1-B9F6-4E9A0C3527AE}" type="presOf" srcId="{0A4ECFBD-868E-4F13-BCE9-1917C87FD509}" destId="{5EED0E7C-099B-4868-9240-FECF04B4294E}" srcOrd="0" destOrd="0" presId="urn:microsoft.com/office/officeart/2005/8/layout/gear1"/>
+    <dgm:cxn modelId="{363BEE8D-C613-42E0-9A1F-5DDDB0E4C44E}" type="presOf" srcId="{0F6965FE-9BB4-431A-BE0B-E1A839F8F717}" destId="{DE6C823B-65ED-458E-A375-CB00069F1564}" srcOrd="1" destOrd="0" presId="urn:microsoft.com/office/officeart/2005/8/layout/gear1"/>
+    <dgm:cxn modelId="{FBA88E9C-1987-4CE5-900F-B4C794E90FDD}" type="presOf" srcId="{D47D05F2-DA36-478E-A9A1-3701A89912DD}" destId="{103E7FB0-9995-42EC-B752-E683753ACC92}" srcOrd="0" destOrd="0" presId="urn:microsoft.com/office/officeart/2005/8/layout/gear1"/>
+    <dgm:cxn modelId="{F907BAA5-BBDE-4950-9E18-C84376C9057D}" type="presOf" srcId="{C22A580B-E437-4732-8E1B-8672F73544C9}" destId="{E98D92D8-A2F7-434E-BEDC-3431A2882AA6}" srcOrd="0" destOrd="0" presId="urn:microsoft.com/office/officeart/2005/8/layout/gear1"/>
+    <dgm:cxn modelId="{4F309EA7-3DB4-49EF-A2D0-2878C040B328}" type="presOf" srcId="{D47D05F2-DA36-478E-A9A1-3701A89912DD}" destId="{43CA3DCE-6F9F-4291-8A40-F1D36DD9450C}" srcOrd="1" destOrd="0" presId="urn:microsoft.com/office/officeart/2005/8/layout/gear1"/>
+    <dgm:cxn modelId="{086952CB-3FBA-479F-92B2-5C2DDCBFA8E9}" type="presOf" srcId="{0F6965FE-9BB4-431A-BE0B-E1A839F8F717}" destId="{AB454299-7616-4EC9-9C82-1AE24634259B}" srcOrd="2" destOrd="0" presId="urn:microsoft.com/office/officeart/2005/8/layout/gear1"/>
     <dgm:cxn modelId="{0EA9D3D0-504F-4570-9E8F-88EEDB59EAB1}" srcId="{BF378784-AD6E-4D0A-A3F8-A2096D4A2404}" destId="{0A4ECFBD-868E-4F13-BCE9-1917C87FD509}" srcOrd="2" destOrd="0" parTransId="{2E2B3CDF-90B7-4ACD-AAD0-6AD5CBC18ADC}" sibTransId="{F99B4C37-7055-4C60-96CA-4D5D13D3ED86}"/>
-    <dgm:cxn modelId="{086952CB-3FBA-479F-92B2-5C2DDCBFA8E9}" type="presOf" srcId="{0F6965FE-9BB4-431A-BE0B-E1A839F8F717}" destId="{AB454299-7616-4EC9-9C82-1AE24634259B}" srcOrd="2" destOrd="0" presId="urn:microsoft.com/office/officeart/2005/8/layout/gear1"/>
-    <dgm:cxn modelId="{0579944B-CF2F-4884-8A20-E4B634341228}" type="presOf" srcId="{0A4ECFBD-868E-4F13-BCE9-1917C87FD509}" destId="{0211FE59-B92B-4DCF-AD08-E4D7DE58F6AD}" srcOrd="3" destOrd="0" presId="urn:microsoft.com/office/officeart/2005/8/layout/gear1"/>
-    <dgm:cxn modelId="{D5FFAC87-14C6-47B1-B9F6-4E9A0C3527AE}" type="presOf" srcId="{0A4ECFBD-868E-4F13-BCE9-1917C87FD509}" destId="{5EED0E7C-099B-4868-9240-FECF04B4294E}" srcOrd="0" destOrd="0" presId="urn:microsoft.com/office/officeart/2005/8/layout/gear1"/>
+    <dgm:cxn modelId="{E54297D7-9BAF-42D1-8D06-54E12652C87A}" srcId="{BF378784-AD6E-4D0A-A3F8-A2096D4A2404}" destId="{0F6965FE-9BB4-431A-BE0B-E1A839F8F717}" srcOrd="1" destOrd="0" parTransId="{899ADE20-C561-4B02-9E4C-4B1F36F61BEF}" sibTransId="{C5C003A9-4ABA-4F33-9E6A-E794CD1F1019}"/>
     <dgm:cxn modelId="{B10A1DF1-2E66-4733-AD3D-1D8350643871}" type="presOf" srcId="{F99B4C37-7055-4C60-96CA-4D5D13D3ED86}" destId="{3B1D865A-9EAA-481A-B523-7D09AA876726}" srcOrd="0" destOrd="0" presId="urn:microsoft.com/office/officeart/2005/8/layout/gear1"/>
-    <dgm:cxn modelId="{4F309EA7-3DB4-49EF-A2D0-2878C040B328}" type="presOf" srcId="{D47D05F2-DA36-478E-A9A1-3701A89912DD}" destId="{43CA3DCE-6F9F-4291-8A40-F1D36DD9450C}" srcOrd="1" destOrd="0" presId="urn:microsoft.com/office/officeart/2005/8/layout/gear1"/>
-    <dgm:cxn modelId="{76F40B60-0652-46AB-A6D9-76587CAD28E9}" type="presOf" srcId="{C5C003A9-4ABA-4F33-9E6A-E794CD1F1019}" destId="{B9858277-4211-4303-86C4-1454BBF67C46}" srcOrd="0" destOrd="0" presId="urn:microsoft.com/office/officeart/2005/8/layout/gear1"/>
-    <dgm:cxn modelId="{E54297D7-9BAF-42D1-8D06-54E12652C87A}" srcId="{BF378784-AD6E-4D0A-A3F8-A2096D4A2404}" destId="{0F6965FE-9BB4-431A-BE0B-E1A839F8F717}" srcOrd="1" destOrd="0" parTransId="{899ADE20-C561-4B02-9E4C-4B1F36F61BEF}" sibTransId="{C5C003A9-4ABA-4F33-9E6A-E794CD1F1019}"/>
-    <dgm:cxn modelId="{F907BAA5-BBDE-4950-9E18-C84376C9057D}" type="presOf" srcId="{C22A580B-E437-4732-8E1B-8672F73544C9}" destId="{E98D92D8-A2F7-434E-BEDC-3431A2882AA6}" srcOrd="0" destOrd="0" presId="urn:microsoft.com/office/officeart/2005/8/layout/gear1"/>
-    <dgm:cxn modelId="{011ED273-3EC5-49CC-AB48-C6099173D8BA}" type="presOf" srcId="{0A4ECFBD-868E-4F13-BCE9-1917C87FD509}" destId="{1FAF9D3C-BFCA-441D-822C-8E6B5BDE5092}" srcOrd="1" destOrd="0" presId="urn:microsoft.com/office/officeart/2005/8/layout/gear1"/>
-    <dgm:cxn modelId="{363BEE8D-C613-42E0-9A1F-5DDDB0E4C44E}" type="presOf" srcId="{0F6965FE-9BB4-431A-BE0B-E1A839F8F717}" destId="{DE6C823B-65ED-458E-A375-CB00069F1564}" srcOrd="1" destOrd="0" presId="urn:microsoft.com/office/officeart/2005/8/layout/gear1"/>
-    <dgm:cxn modelId="{26987E6F-F99D-4167-9D64-4216E2398934}" type="presOf" srcId="{BF378784-AD6E-4D0A-A3F8-A2096D4A2404}" destId="{B7C9F66E-D2C6-46FE-A246-290F09749B65}" srcOrd="0" destOrd="0" presId="urn:microsoft.com/office/officeart/2005/8/layout/gear1"/>
-    <dgm:cxn modelId="{0AA2151C-08C2-4E45-9CBB-63CEC2384167}" type="presOf" srcId="{D47D05F2-DA36-478E-A9A1-3701A89912DD}" destId="{CB98C00C-856B-48DD-8E7E-D91BDD7A0F24}" srcOrd="2" destOrd="0" presId="urn:microsoft.com/office/officeart/2005/8/layout/gear1"/>
-    <dgm:cxn modelId="{27BB837C-8489-4FB8-825C-2E124668F355}" type="presOf" srcId="{0A4ECFBD-868E-4F13-BCE9-1917C87FD509}" destId="{81250124-1105-45C5-9B3D-22B961712496}" srcOrd="2" destOrd="0" presId="urn:microsoft.com/office/officeart/2005/8/layout/gear1"/>
-    <dgm:cxn modelId="{FBA88E9C-1987-4CE5-900F-B4C794E90FDD}" type="presOf" srcId="{D47D05F2-DA36-478E-A9A1-3701A89912DD}" destId="{103E7FB0-9995-42EC-B752-E683753ACC92}" srcOrd="0" destOrd="0" presId="urn:microsoft.com/office/officeart/2005/8/layout/gear1"/>
     <dgm:cxn modelId="{5BC0BEDC-6228-4DE4-AD51-3F27DC246A99}" type="presParOf" srcId="{B7C9F66E-D2C6-46FE-A246-290F09749B65}" destId="{103E7FB0-9995-42EC-B752-E683753ACC92}" srcOrd="0" destOrd="0" presId="urn:microsoft.com/office/officeart/2005/8/layout/gear1"/>
     <dgm:cxn modelId="{878E7A8D-BD83-420E-AC49-9670F4A55602}" type="presParOf" srcId="{B7C9F66E-D2C6-46FE-A246-290F09749B65}" destId="{43CA3DCE-6F9F-4291-8A40-F1D36DD9450C}" srcOrd="1" destOrd="0" presId="urn:microsoft.com/office/officeart/2005/8/layout/gear1"/>
     <dgm:cxn modelId="{C2553C4A-7139-4B9C-921D-D12022FFB6EB}" type="presParOf" srcId="{B7C9F66E-D2C6-46FE-A246-290F09749B65}" destId="{CB98C00C-856B-48DD-8E7E-D91BDD7A0F24}" srcOrd="2" destOrd="0" presId="urn:microsoft.com/office/officeart/2005/8/layout/gear1"/>
@@ -1352,7 +1328,7 @@
         </a:bodyPr>
         <a:lstStyle/>
         <a:p>
-          <a:pPr lvl="0" algn="ctr" defTabSz="2222500">
+          <a:pPr marL="0" lvl="0" indent="0" algn="ctr" defTabSz="2222500">
             <a:lnSpc>
               <a:spcPct val="90000"/>
             </a:lnSpc>
@@ -1362,6 +1338,7 @@
             <a:spcAft>
               <a:spcPct val="35000"/>
             </a:spcAft>
+            <a:buNone/>
           </a:pPr>
           <a:endParaRPr lang="en-US" sz="5000" kern="1200" dirty="0"/>
         </a:p>
@@ -1433,7 +1410,7 @@
         </a:bodyPr>
         <a:lstStyle/>
         <a:p>
-          <a:pPr lvl="0" algn="ctr" defTabSz="1555750">
+          <a:pPr marL="0" lvl="0" indent="0" algn="ctr" defTabSz="1555750">
             <a:lnSpc>
               <a:spcPct val="90000"/>
             </a:lnSpc>
@@ -1443,6 +1420,7 @@
             <a:spcAft>
               <a:spcPct val="35000"/>
             </a:spcAft>
+            <a:buNone/>
           </a:pPr>
           <a:endParaRPr lang="en-US" sz="3500" kern="1200" dirty="0"/>
         </a:p>
@@ -1514,7 +1492,7 @@
         </a:bodyPr>
         <a:lstStyle/>
         <a:p>
-          <a:pPr lvl="0" algn="ctr" defTabSz="1733550">
+          <a:pPr marL="0" lvl="0" indent="0" algn="ctr" defTabSz="1733550">
             <a:lnSpc>
               <a:spcPct val="90000"/>
             </a:lnSpc>
@@ -1524,6 +1502,7 @@
             <a:spcAft>
               <a:spcPct val="35000"/>
             </a:spcAft>
+            <a:buNone/>
           </a:pPr>
           <a:endParaRPr lang="en-US" sz="3900" kern="1200" dirty="0"/>
         </a:p>
@@ -3297,7 +3276,7 @@
           <a:p>
             <a:fld id="{6FBD26F8-183C-4A27-A957-FEA0D666E2FC}" type="datetimeFigureOut">
               <a:rPr lang="fr-FR" smtClean="0"/>
-              <a:t>19/05/2017</a:t>
+              <a:t>20/05/2017</a:t>
             </a:fld>
             <a:endParaRPr lang="fr-FR" dirty="0"/>
           </a:p>
@@ -3361,35 +3340,35 @@
           <a:p>
             <a:pPr lvl="0"/>
             <a:r>
-              <a:rPr lang="en-US" smtClean="0"/>
+              <a:rPr lang="en-US"/>
               <a:t>Edit Master text styles</a:t>
             </a:r>
           </a:p>
           <a:p>
             <a:pPr lvl="1"/>
             <a:r>
-              <a:rPr lang="en-US" smtClean="0"/>
+              <a:rPr lang="en-US"/>
               <a:t>Second level</a:t>
             </a:r>
           </a:p>
           <a:p>
             <a:pPr lvl="2"/>
             <a:r>
-              <a:rPr lang="en-US" smtClean="0"/>
+              <a:rPr lang="en-US"/>
               <a:t>Third level</a:t>
             </a:r>
           </a:p>
           <a:p>
             <a:pPr lvl="3"/>
             <a:r>
-              <a:rPr lang="en-US" smtClean="0"/>
+              <a:rPr lang="en-US"/>
               <a:t>Fourth level</a:t>
             </a:r>
           </a:p>
           <a:p>
             <a:pPr lvl="4"/>
             <a:r>
-              <a:rPr lang="en-US" smtClean="0"/>
+              <a:rPr lang="en-US"/>
               <a:t>Fifth level</a:t>
             </a:r>
             <a:endParaRPr lang="fr-FR"/>
@@ -3607,7 +3586,7 @@
           </a:lstStyle>
           <a:p>
             <a:r>
-              <a:rPr lang="en-US" smtClean="0"/>
+              <a:rPr lang="en-US"/>
               <a:t>Click to edit Master title style</a:t>
             </a:r>
             <a:endParaRPr lang="fr-FR"/>
@@ -3672,7 +3651,7 @@
           </a:lstStyle>
           <a:p>
             <a:r>
-              <a:rPr lang="en-US" smtClean="0"/>
+              <a:rPr lang="en-US"/>
               <a:t>Click to edit Master subtitle style</a:t>
             </a:r>
             <a:endParaRPr lang="fr-FR"/>
@@ -3696,7 +3675,7 @@
           <a:p>
             <a:fld id="{013592B1-8F58-46CE-AE37-812450BF6614}" type="datetimeFigureOut">
               <a:rPr lang="fr-FR" smtClean="0"/>
-              <a:t>19/05/2017</a:t>
+              <a:t>20/05/2017</a:t>
             </a:fld>
             <a:endParaRPr lang="fr-FR" dirty="0"/>
           </a:p>
@@ -3790,7 +3769,7 @@
           <a:lstStyle/>
           <a:p>
             <a:r>
-              <a:rPr lang="en-US" smtClean="0"/>
+              <a:rPr lang="en-US"/>
               <a:t>Click to edit Master title style</a:t>
             </a:r>
             <a:endParaRPr lang="fr-FR"/>
@@ -3814,35 +3793,35 @@
           <a:p>
             <a:pPr lvl="0"/>
             <a:r>
-              <a:rPr lang="en-US" smtClean="0"/>
+              <a:rPr lang="en-US"/>
               <a:t>Edit Master text styles</a:t>
             </a:r>
           </a:p>
           <a:p>
             <a:pPr lvl="1"/>
             <a:r>
-              <a:rPr lang="en-US" smtClean="0"/>
+              <a:rPr lang="en-US"/>
               <a:t>Second level</a:t>
             </a:r>
           </a:p>
           <a:p>
             <a:pPr lvl="2"/>
             <a:r>
-              <a:rPr lang="en-US" smtClean="0"/>
+              <a:rPr lang="en-US"/>
               <a:t>Third level</a:t>
             </a:r>
           </a:p>
           <a:p>
             <a:pPr lvl="3"/>
             <a:r>
-              <a:rPr lang="en-US" smtClean="0"/>
+              <a:rPr lang="en-US"/>
               <a:t>Fourth level</a:t>
             </a:r>
           </a:p>
           <a:p>
             <a:pPr lvl="4"/>
             <a:r>
-              <a:rPr lang="en-US" smtClean="0"/>
+              <a:rPr lang="en-US"/>
               <a:t>Fifth level</a:t>
             </a:r>
             <a:endParaRPr lang="fr-FR"/>
@@ -3866,7 +3845,7 @@
           <a:p>
             <a:fld id="{013592B1-8F58-46CE-AE37-812450BF6614}" type="datetimeFigureOut">
               <a:rPr lang="fr-FR" smtClean="0"/>
-              <a:t>19/05/2017</a:t>
+              <a:t>20/05/2017</a:t>
             </a:fld>
             <a:endParaRPr lang="fr-FR" dirty="0"/>
           </a:p>
@@ -3965,7 +3944,7 @@
           <a:lstStyle/>
           <a:p>
             <a:r>
-              <a:rPr lang="en-US" smtClean="0"/>
+              <a:rPr lang="en-US"/>
               <a:t>Click to edit Master title style</a:t>
             </a:r>
             <a:endParaRPr lang="fr-FR"/>
@@ -3994,35 +3973,35 @@
           <a:p>
             <a:pPr lvl="0"/>
             <a:r>
-              <a:rPr lang="en-US" smtClean="0"/>
+              <a:rPr lang="en-US"/>
               <a:t>Edit Master text styles</a:t>
             </a:r>
           </a:p>
           <a:p>
             <a:pPr lvl="1"/>
             <a:r>
-              <a:rPr lang="en-US" smtClean="0"/>
+              <a:rPr lang="en-US"/>
               <a:t>Second level</a:t>
             </a:r>
           </a:p>
           <a:p>
             <a:pPr lvl="2"/>
             <a:r>
-              <a:rPr lang="en-US" smtClean="0"/>
+              <a:rPr lang="en-US"/>
               <a:t>Third level</a:t>
             </a:r>
           </a:p>
           <a:p>
             <a:pPr lvl="3"/>
             <a:r>
-              <a:rPr lang="en-US" smtClean="0"/>
+              <a:rPr lang="en-US"/>
               <a:t>Fourth level</a:t>
             </a:r>
           </a:p>
           <a:p>
             <a:pPr lvl="4"/>
             <a:r>
-              <a:rPr lang="en-US" smtClean="0"/>
+              <a:rPr lang="en-US"/>
               <a:t>Fifth level</a:t>
             </a:r>
             <a:endParaRPr lang="fr-FR"/>
@@ -4046,7 +4025,7 @@
           <a:p>
             <a:fld id="{013592B1-8F58-46CE-AE37-812450BF6614}" type="datetimeFigureOut">
               <a:rPr lang="fr-FR" smtClean="0"/>
-              <a:t>19/05/2017</a:t>
+              <a:t>20/05/2017</a:t>
             </a:fld>
             <a:endParaRPr lang="fr-FR" dirty="0"/>
           </a:p>
@@ -4140,7 +4119,7 @@
           <a:lstStyle/>
           <a:p>
             <a:r>
-              <a:rPr lang="en-US" smtClean="0"/>
+              <a:rPr lang="en-US"/>
               <a:t>Click to edit Master title style</a:t>
             </a:r>
             <a:endParaRPr lang="fr-FR"/>
@@ -4164,35 +4143,35 @@
           <a:p>
             <a:pPr lvl="0"/>
             <a:r>
-              <a:rPr lang="en-US" smtClean="0"/>
+              <a:rPr lang="en-US"/>
               <a:t>Edit Master text styles</a:t>
             </a:r>
           </a:p>
           <a:p>
             <a:pPr lvl="1"/>
             <a:r>
-              <a:rPr lang="en-US" smtClean="0"/>
+              <a:rPr lang="en-US"/>
               <a:t>Second level</a:t>
             </a:r>
           </a:p>
           <a:p>
             <a:pPr lvl="2"/>
             <a:r>
-              <a:rPr lang="en-US" smtClean="0"/>
+              <a:rPr lang="en-US"/>
               <a:t>Third level</a:t>
             </a:r>
           </a:p>
           <a:p>
             <a:pPr lvl="3"/>
             <a:r>
-              <a:rPr lang="en-US" smtClean="0"/>
+              <a:rPr lang="en-US"/>
               <a:t>Fourth level</a:t>
             </a:r>
           </a:p>
           <a:p>
             <a:pPr lvl="4"/>
             <a:r>
-              <a:rPr lang="en-US" smtClean="0"/>
+              <a:rPr lang="en-US"/>
               <a:t>Fifth level</a:t>
             </a:r>
             <a:endParaRPr lang="fr-FR"/>
@@ -4216,7 +4195,7 @@
           <a:p>
             <a:fld id="{013592B1-8F58-46CE-AE37-812450BF6614}" type="datetimeFigureOut">
               <a:rPr lang="fr-FR" smtClean="0"/>
-              <a:t>19/05/2017</a:t>
+              <a:t>20/05/2017</a:t>
             </a:fld>
             <a:endParaRPr lang="fr-FR" dirty="0"/>
           </a:p>
@@ -4319,7 +4298,7 @@
           </a:lstStyle>
           <a:p>
             <a:r>
-              <a:rPr lang="en-US" smtClean="0"/>
+              <a:rPr lang="en-US"/>
               <a:t>Click to edit Master title style</a:t>
             </a:r>
             <a:endParaRPr lang="fr-FR"/>
@@ -4439,7 +4418,7 @@
           <a:p>
             <a:pPr lvl="0"/>
             <a:r>
-              <a:rPr lang="en-US" smtClean="0"/>
+              <a:rPr lang="en-US"/>
               <a:t>Edit Master text styles</a:t>
             </a:r>
           </a:p>
@@ -4462,7 +4441,7 @@
           <a:p>
             <a:fld id="{013592B1-8F58-46CE-AE37-812450BF6614}" type="datetimeFigureOut">
               <a:rPr lang="fr-FR" smtClean="0"/>
-              <a:t>19/05/2017</a:t>
+              <a:t>20/05/2017</a:t>
             </a:fld>
             <a:endParaRPr lang="fr-FR" dirty="0"/>
           </a:p>
@@ -4556,7 +4535,7 @@
           <a:lstStyle/>
           <a:p>
             <a:r>
-              <a:rPr lang="en-US" smtClean="0"/>
+              <a:rPr lang="en-US"/>
               <a:t>Click to edit Master title style</a:t>
             </a:r>
             <a:endParaRPr lang="fr-FR"/>
@@ -4585,35 +4564,35 @@
           <a:p>
             <a:pPr lvl="0"/>
             <a:r>
-              <a:rPr lang="en-US" smtClean="0"/>
+              <a:rPr lang="en-US"/>
               <a:t>Edit Master text styles</a:t>
             </a:r>
           </a:p>
           <a:p>
             <a:pPr lvl="1"/>
             <a:r>
-              <a:rPr lang="en-US" smtClean="0"/>
+              <a:rPr lang="en-US"/>
               <a:t>Second level</a:t>
             </a:r>
           </a:p>
           <a:p>
             <a:pPr lvl="2"/>
             <a:r>
-              <a:rPr lang="en-US" smtClean="0"/>
+              <a:rPr lang="en-US"/>
               <a:t>Third level</a:t>
             </a:r>
           </a:p>
           <a:p>
             <a:pPr lvl="3"/>
             <a:r>
-              <a:rPr lang="en-US" smtClean="0"/>
+              <a:rPr lang="en-US"/>
               <a:t>Fourth level</a:t>
             </a:r>
           </a:p>
           <a:p>
             <a:pPr lvl="4"/>
             <a:r>
-              <a:rPr lang="en-US" smtClean="0"/>
+              <a:rPr lang="en-US"/>
               <a:t>Fifth level</a:t>
             </a:r>
             <a:endParaRPr lang="fr-FR"/>
@@ -4642,35 +4621,35 @@
           <a:p>
             <a:pPr lvl="0"/>
             <a:r>
-              <a:rPr lang="en-US" smtClean="0"/>
+              <a:rPr lang="en-US"/>
               <a:t>Edit Master text styles</a:t>
             </a:r>
           </a:p>
           <a:p>
             <a:pPr lvl="1"/>
             <a:r>
-              <a:rPr lang="en-US" smtClean="0"/>
+              <a:rPr lang="en-US"/>
               <a:t>Second level</a:t>
             </a:r>
           </a:p>
           <a:p>
             <a:pPr lvl="2"/>
             <a:r>
-              <a:rPr lang="en-US" smtClean="0"/>
+              <a:rPr lang="en-US"/>
               <a:t>Third level</a:t>
             </a:r>
           </a:p>
           <a:p>
             <a:pPr lvl="3"/>
             <a:r>
-              <a:rPr lang="en-US" smtClean="0"/>
+              <a:rPr lang="en-US"/>
               <a:t>Fourth level</a:t>
             </a:r>
           </a:p>
           <a:p>
             <a:pPr lvl="4"/>
             <a:r>
-              <a:rPr lang="en-US" smtClean="0"/>
+              <a:rPr lang="en-US"/>
               <a:t>Fifth level</a:t>
             </a:r>
             <a:endParaRPr lang="fr-FR"/>
@@ -4694,7 +4673,7 @@
           <a:p>
             <a:fld id="{013592B1-8F58-46CE-AE37-812450BF6614}" type="datetimeFigureOut">
               <a:rPr lang="fr-FR" smtClean="0"/>
-              <a:t>19/05/2017</a:t>
+              <a:t>20/05/2017</a:t>
             </a:fld>
             <a:endParaRPr lang="fr-FR" dirty="0"/>
           </a:p>
@@ -4793,7 +4772,7 @@
           <a:lstStyle/>
           <a:p>
             <a:r>
-              <a:rPr lang="en-US" smtClean="0"/>
+              <a:rPr lang="en-US"/>
               <a:t>Click to edit Master title style</a:t>
             </a:r>
             <a:endParaRPr lang="fr-FR"/>
@@ -4859,7 +4838,7 @@
           <a:p>
             <a:pPr lvl="0"/>
             <a:r>
-              <a:rPr lang="en-US" smtClean="0"/>
+              <a:rPr lang="en-US"/>
               <a:t>Edit Master text styles</a:t>
             </a:r>
           </a:p>
@@ -4887,35 +4866,35 @@
           <a:p>
             <a:pPr lvl="0"/>
             <a:r>
-              <a:rPr lang="en-US" smtClean="0"/>
+              <a:rPr lang="en-US"/>
               <a:t>Edit Master text styles</a:t>
             </a:r>
           </a:p>
           <a:p>
             <a:pPr lvl="1"/>
             <a:r>
-              <a:rPr lang="en-US" smtClean="0"/>
+              <a:rPr lang="en-US"/>
               <a:t>Second level</a:t>
             </a:r>
           </a:p>
           <a:p>
             <a:pPr lvl="2"/>
             <a:r>
-              <a:rPr lang="en-US" smtClean="0"/>
+              <a:rPr lang="en-US"/>
               <a:t>Third level</a:t>
             </a:r>
           </a:p>
           <a:p>
             <a:pPr lvl="3"/>
             <a:r>
-              <a:rPr lang="en-US" smtClean="0"/>
+              <a:rPr lang="en-US"/>
               <a:t>Fourth level</a:t>
             </a:r>
           </a:p>
           <a:p>
             <a:pPr lvl="4"/>
             <a:r>
-              <a:rPr lang="en-US" smtClean="0"/>
+              <a:rPr lang="en-US"/>
               <a:t>Fifth level</a:t>
             </a:r>
             <a:endParaRPr lang="fr-FR"/>
@@ -4981,7 +4960,7 @@
           <a:p>
             <a:pPr lvl="0"/>
             <a:r>
-              <a:rPr lang="en-US" smtClean="0"/>
+              <a:rPr lang="en-US"/>
               <a:t>Edit Master text styles</a:t>
             </a:r>
           </a:p>
@@ -5009,35 +4988,35 @@
           <a:p>
             <a:pPr lvl="0"/>
             <a:r>
-              <a:rPr lang="en-US" smtClean="0"/>
+              <a:rPr lang="en-US"/>
               <a:t>Edit Master text styles</a:t>
             </a:r>
           </a:p>
           <a:p>
             <a:pPr lvl="1"/>
             <a:r>
-              <a:rPr lang="en-US" smtClean="0"/>
+              <a:rPr lang="en-US"/>
               <a:t>Second level</a:t>
             </a:r>
           </a:p>
           <a:p>
             <a:pPr lvl="2"/>
             <a:r>
-              <a:rPr lang="en-US" smtClean="0"/>
+              <a:rPr lang="en-US"/>
               <a:t>Third level</a:t>
             </a:r>
           </a:p>
           <a:p>
             <a:pPr lvl="3"/>
             <a:r>
-              <a:rPr lang="en-US" smtClean="0"/>
+              <a:rPr lang="en-US"/>
               <a:t>Fourth level</a:t>
             </a:r>
           </a:p>
           <a:p>
             <a:pPr lvl="4"/>
             <a:r>
-              <a:rPr lang="en-US" smtClean="0"/>
+              <a:rPr lang="en-US"/>
               <a:t>Fifth level</a:t>
             </a:r>
             <a:endParaRPr lang="fr-FR"/>
@@ -5061,7 +5040,7 @@
           <a:p>
             <a:fld id="{013592B1-8F58-46CE-AE37-812450BF6614}" type="datetimeFigureOut">
               <a:rPr lang="fr-FR" smtClean="0"/>
-              <a:t>19/05/2017</a:t>
+              <a:t>20/05/2017</a:t>
             </a:fld>
             <a:endParaRPr lang="fr-FR" dirty="0"/>
           </a:p>
@@ -5155,7 +5134,7 @@
           <a:lstStyle/>
           <a:p>
             <a:r>
-              <a:rPr lang="en-US" smtClean="0"/>
+              <a:rPr lang="en-US"/>
               <a:t>Click to edit Master title style</a:t>
             </a:r>
             <a:endParaRPr lang="fr-FR"/>
@@ -5179,7 +5158,7 @@
           <a:p>
             <a:fld id="{013592B1-8F58-46CE-AE37-812450BF6614}" type="datetimeFigureOut">
               <a:rPr lang="fr-FR" smtClean="0"/>
-              <a:t>19/05/2017</a:t>
+              <a:t>20/05/2017</a:t>
             </a:fld>
             <a:endParaRPr lang="fr-FR" dirty="0"/>
           </a:p>
@@ -5274,7 +5253,7 @@
           <a:p>
             <a:fld id="{013592B1-8F58-46CE-AE37-812450BF6614}" type="datetimeFigureOut">
               <a:rPr lang="fr-FR" smtClean="0"/>
-              <a:t>19/05/2017</a:t>
+              <a:t>20/05/2017</a:t>
             </a:fld>
             <a:endParaRPr lang="fr-FR" dirty="0"/>
           </a:p>
@@ -5377,7 +5356,7 @@
           </a:lstStyle>
           <a:p>
             <a:r>
-              <a:rPr lang="en-US" smtClean="0"/>
+              <a:rPr lang="en-US"/>
               <a:t>Click to edit Master title style</a:t>
             </a:r>
             <a:endParaRPr lang="fr-FR"/>
@@ -5434,35 +5413,35 @@
           <a:p>
             <a:pPr lvl="0"/>
             <a:r>
-              <a:rPr lang="en-US" smtClean="0"/>
+              <a:rPr lang="en-US"/>
               <a:t>Edit Master text styles</a:t>
             </a:r>
           </a:p>
           <a:p>
             <a:pPr lvl="1"/>
             <a:r>
-              <a:rPr lang="en-US" smtClean="0"/>
+              <a:rPr lang="en-US"/>
               <a:t>Second level</a:t>
             </a:r>
           </a:p>
           <a:p>
             <a:pPr lvl="2"/>
             <a:r>
-              <a:rPr lang="en-US" smtClean="0"/>
+              <a:rPr lang="en-US"/>
               <a:t>Third level</a:t>
             </a:r>
           </a:p>
           <a:p>
             <a:pPr lvl="3"/>
             <a:r>
-              <a:rPr lang="en-US" smtClean="0"/>
+              <a:rPr lang="en-US"/>
               <a:t>Fourth level</a:t>
             </a:r>
           </a:p>
           <a:p>
             <a:pPr lvl="4"/>
             <a:r>
-              <a:rPr lang="en-US" smtClean="0"/>
+              <a:rPr lang="en-US"/>
               <a:t>Fifth level</a:t>
             </a:r>
             <a:endParaRPr lang="fr-FR"/>
@@ -5528,7 +5507,7 @@
           <a:p>
             <a:pPr lvl="0"/>
             <a:r>
-              <a:rPr lang="en-US" smtClean="0"/>
+              <a:rPr lang="en-US"/>
               <a:t>Edit Master text styles</a:t>
             </a:r>
           </a:p>
@@ -5551,7 +5530,7 @@
           <a:p>
             <a:fld id="{013592B1-8F58-46CE-AE37-812450BF6614}" type="datetimeFigureOut">
               <a:rPr lang="fr-FR" smtClean="0"/>
-              <a:t>19/05/2017</a:t>
+              <a:t>20/05/2017</a:t>
             </a:fld>
             <a:endParaRPr lang="fr-FR" dirty="0"/>
           </a:p>
@@ -5654,7 +5633,7 @@
           </a:lstStyle>
           <a:p>
             <a:r>
-              <a:rPr lang="en-US" smtClean="0"/>
+              <a:rPr lang="en-US"/>
               <a:t>Click to edit Master title style</a:t>
             </a:r>
             <a:endParaRPr lang="fr-FR"/>
@@ -5781,7 +5760,7 @@
           <a:p>
             <a:pPr lvl="0"/>
             <a:r>
-              <a:rPr lang="en-US" smtClean="0"/>
+              <a:rPr lang="en-US"/>
               <a:t>Edit Master text styles</a:t>
             </a:r>
           </a:p>
@@ -5804,7 +5783,7 @@
           <a:p>
             <a:fld id="{013592B1-8F58-46CE-AE37-812450BF6614}" type="datetimeFigureOut">
               <a:rPr lang="fr-FR" smtClean="0"/>
-              <a:t>19/05/2017</a:t>
+              <a:t>20/05/2017</a:t>
             </a:fld>
             <a:endParaRPr lang="fr-FR" dirty="0"/>
           </a:p>
@@ -5913,7 +5892,7 @@
           <a:lstStyle/>
           <a:p>
             <a:r>
-              <a:rPr lang="en-US" smtClean="0"/>
+              <a:rPr lang="en-US"/>
               <a:t>Click to edit Master title style</a:t>
             </a:r>
             <a:endParaRPr lang="fr-FR"/>
@@ -5947,35 +5926,35 @@
           <a:p>
             <a:pPr lvl="0"/>
             <a:r>
-              <a:rPr lang="en-US" smtClean="0"/>
+              <a:rPr lang="en-US"/>
               <a:t>Edit Master text styles</a:t>
             </a:r>
           </a:p>
           <a:p>
             <a:pPr lvl="1"/>
             <a:r>
-              <a:rPr lang="en-US" smtClean="0"/>
+              <a:rPr lang="en-US"/>
               <a:t>Second level</a:t>
             </a:r>
           </a:p>
           <a:p>
             <a:pPr lvl="2"/>
             <a:r>
-              <a:rPr lang="en-US" smtClean="0"/>
+              <a:rPr lang="en-US"/>
               <a:t>Third level</a:t>
             </a:r>
           </a:p>
           <a:p>
             <a:pPr lvl="3"/>
             <a:r>
-              <a:rPr lang="en-US" smtClean="0"/>
+              <a:rPr lang="en-US"/>
               <a:t>Fourth level</a:t>
             </a:r>
           </a:p>
           <a:p>
             <a:pPr lvl="4"/>
             <a:r>
-              <a:rPr lang="en-US" smtClean="0"/>
+              <a:rPr lang="en-US"/>
               <a:t>Fifth level</a:t>
             </a:r>
             <a:endParaRPr lang="fr-FR"/>
@@ -6017,7 +5996,7 @@
           <a:p>
             <a:fld id="{013592B1-8F58-46CE-AE37-812450BF6614}" type="datetimeFigureOut">
               <a:rPr lang="fr-FR" smtClean="0"/>
-              <a:t>19/05/2017</a:t>
+              <a:t>20/05/2017</a:t>
             </a:fld>
             <a:endParaRPr lang="fr-FR" dirty="0"/>
           </a:p>
@@ -6445,7 +6424,7 @@
           <a:lstStyle/>
           <a:p>
             <a:r>
-              <a:rPr lang="en-US" sz="4400" dirty="0" smtClean="0">
+              <a:rPr lang="en-US" sz="4400" dirty="0">
                 <a:solidFill>
                   <a:srgbClr val="348874"/>
                 </a:solidFill>
@@ -6456,7 +6435,7 @@
               <a:t>Présentation de </a:t>
             </a:r>
             <a:r>
-              <a:rPr lang="fr-FR" sz="4400" dirty="0" smtClean="0">
+              <a:rPr lang="fr-FR" sz="4400" dirty="0">
                 <a:solidFill>
                   <a:srgbClr val="348874"/>
                 </a:solidFill>
@@ -6467,7 +6446,7 @@
               <a:t>projet</a:t>
             </a:r>
             <a:r>
-              <a:rPr lang="en-US" sz="4400" dirty="0" smtClean="0">
+              <a:rPr lang="en-US" sz="4400" dirty="0">
                 <a:solidFill>
                   <a:srgbClr val="348874"/>
                 </a:solidFill>
@@ -6475,21 +6454,10 @@
                 <a:ea typeface="Microsoft Sans Serif" panose="020B0604020202020204" pitchFamily="34" charset="0"/>
                 <a:cs typeface="Microsoft Sans Serif" panose="020B0604020202020204" pitchFamily="34" charset="0"/>
               </a:rPr>
-              <a:t> </a:t>
+              <a:t> du fin </a:t>
             </a:r>
             <a:r>
-              <a:rPr lang="en-US" sz="4400" dirty="0" smtClean="0">
-                <a:solidFill>
-                  <a:srgbClr val="348874"/>
-                </a:solidFill>
-                <a:latin typeface="Microsoft Sans Serif" panose="020B0604020202020204" pitchFamily="34" charset="0"/>
-                <a:ea typeface="Microsoft Sans Serif" panose="020B0604020202020204" pitchFamily="34" charset="0"/>
-                <a:cs typeface="Microsoft Sans Serif" panose="020B0604020202020204" pitchFamily="34" charset="0"/>
-              </a:rPr>
-              <a:t>du fin </a:t>
-            </a:r>
-            <a:r>
-              <a:rPr lang="fr-FR" sz="4400" dirty="0" smtClean="0">
+              <a:rPr lang="fr-FR" sz="4400" dirty="0">
                 <a:solidFill>
                   <a:srgbClr val="348874"/>
                 </a:solidFill>
@@ -6499,14 +6467,6 @@
               </a:rPr>
               <a:t>d’étude</a:t>
             </a:r>
-            <a:endParaRPr lang="fr-FR" sz="4400" dirty="0">
-              <a:solidFill>
-                <a:srgbClr val="348874"/>
-              </a:solidFill>
-              <a:latin typeface="Microsoft Sans Serif" panose="020B0604020202020204" pitchFamily="34" charset="0"/>
-              <a:ea typeface="Microsoft Sans Serif" panose="020B0604020202020204" pitchFamily="34" charset="0"/>
-              <a:cs typeface="Microsoft Sans Serif" panose="020B0604020202020204" pitchFamily="34" charset="0"/>
-            </a:endParaRPr>
           </a:p>
         </p:txBody>
       </p:sp>
@@ -6606,7 +6566,7 @@
           <a:lstStyle/>
           <a:p>
             <a:r>
-              <a:rPr lang="fr-FR" dirty="0" smtClean="0">
+              <a:rPr lang="fr-FR" dirty="0">
                 <a:solidFill>
                   <a:schemeClr val="bg1">
                     <a:lumMod val="50000"/>
@@ -6618,7 +6578,7 @@
           </a:p>
           <a:p>
             <a:r>
-              <a:rPr lang="fr-FR" dirty="0" smtClean="0">
+              <a:rPr lang="fr-FR" dirty="0">
                 <a:solidFill>
                   <a:schemeClr val="bg1">
                     <a:lumMod val="50000"/>
@@ -6630,7 +6590,7 @@
           </a:p>
           <a:p>
             <a:r>
-              <a:rPr lang="fr-FR" dirty="0" smtClean="0">
+              <a:rPr lang="fr-FR" dirty="0">
                 <a:solidFill>
                   <a:schemeClr val="bg1">
                     <a:lumMod val="50000"/>
@@ -6639,13 +6599,6 @@
               </a:rPr>
               <a:t>Mohamed Sidatt Alem</a:t>
             </a:r>
-            <a:endParaRPr lang="fr-FR" dirty="0">
-              <a:solidFill>
-                <a:schemeClr val="bg1">
-                  <a:lumMod val="50000"/>
-                </a:schemeClr>
-              </a:solidFill>
-            </a:endParaRPr>
           </a:p>
         </p:txBody>
       </p:sp>
@@ -6672,7 +6625,7 @@
           <a:lstStyle/>
           <a:p>
             <a:r>
-              <a:rPr lang="fr-FR" dirty="0" smtClean="0">
+              <a:rPr lang="fr-FR" dirty="0">
                 <a:solidFill>
                   <a:schemeClr val="bg1">
                     <a:lumMod val="50000"/>
@@ -6682,24 +6635,14 @@
               <a:t>Encadré</a:t>
             </a:r>
             <a:r>
-              <a:rPr lang="en-US" dirty="0" smtClean="0">
+              <a:rPr lang="en-US" dirty="0">
                 <a:solidFill>
                   <a:schemeClr val="bg1">
                     <a:lumMod val="50000"/>
                   </a:schemeClr>
                 </a:solidFill>
               </a:rPr>
-              <a:t> </a:t>
-            </a:r>
-            <a:r>
-              <a:rPr lang="en-US" dirty="0" smtClean="0">
-                <a:solidFill>
-                  <a:schemeClr val="bg1">
-                    <a:lumMod val="50000"/>
-                  </a:schemeClr>
-                </a:solidFill>
-              </a:rPr>
-              <a:t>par:</a:t>
+              <a:t> par:</a:t>
             </a:r>
           </a:p>
           <a:p>
@@ -6776,7 +6719,7 @@
           <a:lstStyle/>
           <a:p>
             <a:r>
-              <a:rPr lang="en-US" sz="1600" dirty="0" smtClean="0">
+              <a:rPr lang="en-US" sz="1600" dirty="0">
                 <a:solidFill>
                   <a:schemeClr val="bg1">
                     <a:lumMod val="50000"/>
@@ -6786,7 +6729,7 @@
               <a:t>Ann</a:t>
             </a:r>
             <a:r>
-              <a:rPr lang="fr-FR" sz="1600" dirty="0" smtClean="0">
+              <a:rPr lang="fr-FR" sz="1600" dirty="0">
                 <a:solidFill>
                   <a:schemeClr val="bg1">
                     <a:lumMod val="50000"/>
@@ -6796,7 +6739,7 @@
               <a:t>é</a:t>
             </a:r>
             <a:r>
-              <a:rPr lang="en-US" sz="1600" dirty="0" smtClean="0">
+              <a:rPr lang="en-US" sz="1600" dirty="0">
                 <a:solidFill>
                   <a:schemeClr val="bg1">
                     <a:lumMod val="50000"/>
@@ -6838,7 +6781,7 @@
           <a:lstStyle/>
           <a:p>
             <a:r>
-              <a:rPr lang="fr-FR" dirty="0" smtClean="0">
+              <a:rPr lang="fr-FR" dirty="0">
                 <a:solidFill>
                   <a:schemeClr val="bg1">
                     <a:lumMod val="50000"/>
@@ -6847,13 +6790,6 @@
               </a:rPr>
               <a:t>Institut Supérieur de Comptabilité et d’Administration d’Entreprises</a:t>
             </a:r>
-            <a:endParaRPr lang="fr-FR" dirty="0">
-              <a:solidFill>
-                <a:schemeClr val="bg1">
-                  <a:lumMod val="50000"/>
-                </a:schemeClr>
-              </a:solidFill>
-            </a:endParaRPr>
           </a:p>
         </p:txBody>
       </p:sp>
@@ -7606,7 +7542,7 @@
           <a:lstStyle/>
           <a:p>
             <a:r>
-              <a:rPr lang="fr-FR" sz="4400" dirty="0" smtClean="0">
+              <a:rPr lang="fr-FR" sz="4400" dirty="0">
                 <a:solidFill>
                   <a:schemeClr val="bg1"/>
                 </a:solidFill>
@@ -7615,13 +7551,6 @@
               </a:rPr>
               <a:t>Développement</a:t>
             </a:r>
-            <a:endParaRPr lang="fr-FR" sz="4400" dirty="0">
-              <a:solidFill>
-                <a:schemeClr val="bg1"/>
-              </a:solidFill>
-              <a:ea typeface="Microsoft Sans Serif" panose="020B0604020202020204" pitchFamily="34" charset="0"/>
-              <a:cs typeface="Microsoft Sans Serif" panose="020B0604020202020204" pitchFamily="34" charset="0"/>
-            </a:endParaRPr>
           </a:p>
         </p:txBody>
       </p:sp>
@@ -8132,7 +8061,7 @@
           <a:lstStyle/>
           <a:p>
             <a:r>
-              <a:rPr lang="fr-FR" sz="4400" dirty="0" smtClean="0">
+              <a:rPr lang="fr-FR" sz="4400" dirty="0">
                 <a:solidFill>
                   <a:schemeClr val="bg1"/>
                 </a:solidFill>
@@ -8141,13 +8070,6 @@
               </a:rPr>
               <a:t>Sécurité</a:t>
             </a:r>
-            <a:endParaRPr lang="fr-FR" sz="4400" dirty="0">
-              <a:solidFill>
-                <a:schemeClr val="bg1"/>
-              </a:solidFill>
-              <a:ea typeface="Microsoft Sans Serif" panose="020B0604020202020204" pitchFamily="34" charset="0"/>
-              <a:cs typeface="Microsoft Sans Serif" panose="020B0604020202020204" pitchFamily="34" charset="0"/>
-            </a:endParaRPr>
           </a:p>
         </p:txBody>
       </p:sp>
@@ -8547,7 +8469,7 @@
           <a:lstStyle/>
           <a:p>
             <a:r>
-              <a:rPr lang="en-US" sz="4000" dirty="0" smtClean="0">
+              <a:rPr lang="en-US" sz="4000" dirty="0">
                 <a:solidFill>
                   <a:schemeClr val="accent6">
                     <a:lumMod val="60000"/>
@@ -8671,7 +8593,7 @@
           <a:lstStyle/>
           <a:p>
             <a:r>
-              <a:rPr lang="en-US" sz="4000" dirty="0" smtClean="0">
+              <a:rPr lang="en-US" sz="4000" dirty="0">
                 <a:solidFill>
                   <a:schemeClr val="accent6">
                     <a:lumMod val="60000"/>
@@ -8706,13 +8628,13 @@
   <p:clrMapOvr>
     <a:masterClrMapping/>
   </p:clrMapOvr>
-  <mc:AlternateContent xmlns:mc="http://schemas.openxmlformats.org/markup-compatibility/2006">
-    <mc:Choice xmlns:p14="http://schemas.microsoft.com/office/powerpoint/2010/main" Requires="p14">
+  <mc:AlternateContent xmlns:mc="http://schemas.openxmlformats.org/markup-compatibility/2006" xmlns:p14="http://schemas.microsoft.com/office/powerpoint/2010/main">
+    <mc:Choice Requires="p14">
       <p:transition spd="slow" p14:dur="1500">
         <p:split orient="vert"/>
       </p:transition>
     </mc:Choice>
-    <mc:Fallback>
+    <mc:Fallback xmlns="">
       <p:transition spd="slow">
         <p:split orient="vert"/>
       </p:transition>
@@ -9237,7 +9159,7 @@
           <a:lstStyle/>
           <a:p>
             <a:r>
-              <a:rPr lang="en-US" sz="4000" dirty="0" smtClean="0">
+              <a:rPr lang="en-US" sz="4000" dirty="0">
                 <a:solidFill>
                   <a:srgbClr val="348874"/>
                 </a:solidFill>
@@ -9470,7 +9392,7 @@
           <a:lstStyle/>
           <a:p>
             <a:r>
-              <a:rPr lang="en-US" sz="2000" dirty="0" smtClean="0">
+              <a:rPr lang="en-US" sz="2000" dirty="0">
                 <a:solidFill>
                   <a:schemeClr val="bg1">
                     <a:lumMod val="50000"/>
@@ -9516,7 +9438,7 @@
           <a:lstStyle/>
           <a:p>
             <a:r>
-              <a:rPr lang="fr-FR" sz="2000" dirty="0" smtClean="0">
+              <a:rPr lang="fr-FR" sz="2000" dirty="0">
                 <a:solidFill>
                   <a:schemeClr val="bg1">
                     <a:lumMod val="50000"/>
@@ -9527,15 +9449,6 @@
               </a:rPr>
               <a:t>Développement</a:t>
             </a:r>
-            <a:endParaRPr lang="fr-FR" sz="2000" dirty="0">
-              <a:solidFill>
-                <a:schemeClr val="bg1">
-                  <a:lumMod val="50000"/>
-                </a:schemeClr>
-              </a:solidFill>
-              <a:ea typeface="Microsoft Sans Serif" panose="020B0604020202020204" pitchFamily="34" charset="0"/>
-              <a:cs typeface="Microsoft Sans Serif" panose="020B0604020202020204" pitchFamily="34" charset="0"/>
-            </a:endParaRPr>
           </a:p>
         </p:txBody>
       </p:sp>
@@ -9562,7 +9475,7 @@
           <a:lstStyle/>
           <a:p>
             <a:r>
-              <a:rPr lang="fr-FR" sz="2000" dirty="0" smtClean="0">
+              <a:rPr lang="fr-FR" sz="2000" dirty="0">
                 <a:solidFill>
                   <a:schemeClr val="bg1">
                     <a:lumMod val="50000"/>
@@ -9573,15 +9486,6 @@
               </a:rPr>
               <a:t>Sécurité</a:t>
             </a:r>
-            <a:endParaRPr lang="fr-FR" sz="2000" dirty="0">
-              <a:solidFill>
-                <a:schemeClr val="bg1">
-                  <a:lumMod val="50000"/>
-                </a:schemeClr>
-              </a:solidFill>
-              <a:ea typeface="Microsoft Sans Serif" panose="020B0604020202020204" pitchFamily="34" charset="0"/>
-              <a:cs typeface="Microsoft Sans Serif" panose="020B0604020202020204" pitchFamily="34" charset="0"/>
-            </a:endParaRPr>
           </a:p>
         </p:txBody>
       </p:sp>
@@ -9608,7 +9512,7 @@
           <a:lstStyle/>
           <a:p>
             <a:r>
-              <a:rPr lang="fr-FR" sz="2000" dirty="0" smtClean="0">
+              <a:rPr lang="fr-FR" sz="2000" dirty="0">
                 <a:solidFill>
                   <a:schemeClr val="bg1">
                     <a:lumMod val="50000"/>
@@ -9619,15 +9523,6 @@
               </a:rPr>
               <a:t>Conclusion</a:t>
             </a:r>
-            <a:endParaRPr lang="fr-FR" sz="2000" dirty="0">
-              <a:solidFill>
-                <a:schemeClr val="bg1">
-                  <a:lumMod val="50000"/>
-                </a:schemeClr>
-              </a:solidFill>
-              <a:ea typeface="Microsoft Sans Serif" panose="020B0604020202020204" pitchFamily="34" charset="0"/>
-              <a:cs typeface="Microsoft Sans Serif" panose="020B0604020202020204" pitchFamily="34" charset="0"/>
-            </a:endParaRPr>
           </a:p>
         </p:txBody>
       </p:sp>
@@ -10595,7 +10490,7 @@
           <a:lstStyle/>
           <a:p>
             <a:r>
-              <a:rPr lang="en-US" sz="4400" dirty="0" smtClean="0">
+              <a:rPr lang="en-US" sz="4400" dirty="0">
                 <a:solidFill>
                   <a:schemeClr val="bg1"/>
                 </a:solidFill>
@@ -11137,13 +11032,13 @@
   <p:clrMapOvr>
     <a:masterClrMapping/>
   </p:clrMapOvr>
-  <mc:AlternateContent xmlns:mc="http://schemas.openxmlformats.org/markup-compatibility/2006">
-    <mc:Choice xmlns:p14="http://schemas.microsoft.com/office/powerpoint/2010/main" Requires="p14">
+  <mc:AlternateContent xmlns:mc="http://schemas.openxmlformats.org/markup-compatibility/2006" xmlns:p14="http://schemas.microsoft.com/office/powerpoint/2010/main">
+    <mc:Choice Requires="p14">
       <p:transition spd="slow" p14:dur="1400">
         <p14:ripple/>
       </p:transition>
     </mc:Choice>
-    <mc:Fallback>
+    <mc:Fallback xmlns="">
       <p:transition spd="slow">
         <p:fade/>
       </p:transition>
@@ -12387,7 +12282,7 @@
           <a:lstStyle/>
           <a:p>
             <a:r>
-              <a:rPr lang="en-US" sz="4400" dirty="0" smtClean="0">
+              <a:rPr lang="en-US" sz="4400" dirty="0">
                 <a:solidFill>
                   <a:schemeClr val="bg1"/>
                 </a:solidFill>
@@ -12785,7 +12680,7 @@
           <a:lstStyle/>
           <a:p>
             <a:r>
-              <a:rPr lang="fr-FR" sz="6000" dirty="0" smtClean="0">
+              <a:rPr lang="fr-FR" sz="6000" dirty="0">
                 <a:solidFill>
                   <a:schemeClr val="tx1">
                     <a:lumMod val="95000"/>
@@ -12796,15 +12691,6 @@
               </a:rPr>
               <a:t>Modélisation</a:t>
             </a:r>
-            <a:endParaRPr lang="fr-FR" sz="6000" dirty="0">
-              <a:solidFill>
-                <a:schemeClr val="tx1">
-                  <a:lumMod val="95000"/>
-                  <a:lumOff val="5000"/>
-                </a:schemeClr>
-              </a:solidFill>
-              <a:latin typeface="Century Gothic" panose="020B0502020202020204" pitchFamily="34" charset="0"/>
-            </a:endParaRPr>
           </a:p>
         </p:txBody>
       </p:sp>
@@ -12977,7 +12863,7 @@
           <a:lstStyle/>
           <a:p>
             <a:r>
-              <a:rPr lang="fr-FR" sz="2400" dirty="0" smtClean="0">
+              <a:rPr lang="fr-FR" sz="2400" dirty="0">
                 <a:solidFill>
                   <a:schemeClr val="tx1">
                     <a:lumMod val="95000"/>
@@ -12989,7 +12875,7 @@
               <a:t>Pourquoi</a:t>
             </a:r>
             <a:r>
-              <a:rPr lang="en-US" sz="2400" dirty="0" smtClean="0">
+              <a:rPr lang="en-US" sz="2400" dirty="0">
                 <a:solidFill>
                   <a:schemeClr val="tx1">
                     <a:lumMod val="95000"/>
@@ -13035,7 +12921,7 @@
           <a:lstStyle/>
           <a:p>
             <a:r>
-              <a:rPr lang="en-US" sz="2400" dirty="0" smtClean="0">
+              <a:rPr lang="en-US" sz="2400" dirty="0">
                 <a:solidFill>
                   <a:schemeClr val="tx1">
                     <a:lumMod val="95000"/>
@@ -13047,7 +12933,7 @@
               <a:t>Model </a:t>
             </a:r>
             <a:r>
-              <a:rPr lang="fr-FR" sz="2400" dirty="0" smtClean="0">
+              <a:rPr lang="fr-FR" sz="2400" dirty="0">
                 <a:solidFill>
                   <a:schemeClr val="tx1">
                     <a:lumMod val="95000"/>
@@ -13058,15 +12944,6 @@
               </a:rPr>
               <a:t>Conceptuel</a:t>
             </a:r>
-            <a:endParaRPr lang="fr-FR" sz="2400" dirty="0">
-              <a:solidFill>
-                <a:schemeClr val="tx1">
-                  <a:lumMod val="95000"/>
-                  <a:lumOff val="5000"/>
-                </a:schemeClr>
-              </a:solidFill>
-              <a:latin typeface="Segoe Script" panose="030B0504020000000003" pitchFamily="66" charset="0"/>
-            </a:endParaRPr>
           </a:p>
         </p:txBody>
       </p:sp>
@@ -13093,7 +12970,7 @@
           <a:lstStyle/>
           <a:p>
             <a:r>
-              <a:rPr lang="fr-FR" sz="2400" dirty="0" smtClean="0">
+              <a:rPr lang="fr-FR" sz="2400" dirty="0">
                 <a:solidFill>
                   <a:schemeClr val="tx1">
                     <a:lumMod val="95000"/>
@@ -13105,7 +12982,7 @@
               <a:t>Pourquoi</a:t>
             </a:r>
             <a:r>
-              <a:rPr lang="en-US" sz="2400" dirty="0" smtClean="0">
+              <a:rPr lang="en-US" sz="2400" dirty="0">
                 <a:solidFill>
                   <a:schemeClr val="tx1">
                     <a:lumMod val="95000"/>
@@ -13197,7 +13074,7 @@
         <p:spPr>
           <a:xfrm>
             <a:off x="8649975" y="3246753"/>
-            <a:ext cx="2097741" cy="646331"/>
+            <a:ext cx="2295529" cy="646331"/>
           </a:xfrm>
           <a:prstGeom prst="rect">
             <a:avLst/>
@@ -13211,7 +13088,7 @@
           <a:lstStyle/>
           <a:p>
             <a:r>
-              <a:rPr lang="fr-FR" sz="3600" dirty="0" smtClean="0">
+              <a:rPr lang="fr-FR" sz="3600" dirty="0">
                 <a:ln w="0"/>
                 <a:solidFill>
                   <a:schemeClr val="tx1">
@@ -13232,25 +13109,6 @@
               </a:rPr>
               <a:t>Entités</a:t>
             </a:r>
-            <a:endParaRPr lang="fr-FR" sz="3600" dirty="0">
-              <a:ln w="0"/>
-              <a:solidFill>
-                <a:schemeClr val="tx1">
-                  <a:lumMod val="75000"/>
-                  <a:lumOff val="25000"/>
-                </a:schemeClr>
-              </a:solidFill>
-              <a:effectLst>
-                <a:outerShdw blurRad="38100" dist="19050" dir="2700000" algn="tl" rotWithShape="0">
-                  <a:schemeClr val="dk1">
-                    <a:alpha val="40000"/>
-                  </a:schemeClr>
-                </a:outerShdw>
-              </a:effectLst>
-              <a:latin typeface="Kozuka Gothic Pr6N L" panose="020B0200000000000000" pitchFamily="34" charset="-128"/>
-              <a:ea typeface="Kozuka Gothic Pr6N L" panose="020B0200000000000000" pitchFamily="34" charset="-128"/>
-              <a:cs typeface="Times New Roman" panose="02020603050405020304" pitchFamily="18" charset="0"/>
-            </a:endParaRPr>
           </a:p>
         </p:txBody>
       </p:sp>
@@ -13296,7 +13154,7 @@
           <a:lstStyle/>
           <a:p>
             <a:r>
-              <a:rPr lang="en-US" sz="2400" dirty="0" smtClean="0">
+              <a:rPr lang="en-US" sz="2400" dirty="0">
                 <a:ln w="0"/>
                 <a:solidFill>
                   <a:schemeClr val="tx1"/>
@@ -13340,7 +13198,7 @@
         <p:spPr>
           <a:xfrm>
             <a:off x="8649974" y="4810714"/>
-            <a:ext cx="2097741" cy="646331"/>
+            <a:ext cx="2677668" cy="646331"/>
           </a:xfrm>
           <a:prstGeom prst="rect">
             <a:avLst/>
@@ -13354,7 +13212,7 @@
           <a:lstStyle/>
           <a:p>
             <a:r>
-              <a:rPr lang="fr-FR" sz="3600" dirty="0" smtClean="0">
+              <a:rPr lang="fr-FR" sz="3600" dirty="0">
                 <a:ln w="0"/>
                 <a:solidFill>
                   <a:schemeClr val="tx1">
@@ -13375,25 +13233,6 @@
               </a:rPr>
               <a:t>Relations</a:t>
             </a:r>
-            <a:endParaRPr lang="fr-FR" sz="3600" dirty="0">
-              <a:ln w="0"/>
-              <a:solidFill>
-                <a:schemeClr val="tx1">
-                  <a:lumMod val="75000"/>
-                  <a:lumOff val="25000"/>
-                </a:schemeClr>
-              </a:solidFill>
-              <a:effectLst>
-                <a:outerShdw blurRad="38100" dist="19050" dir="2700000" algn="tl" rotWithShape="0">
-                  <a:schemeClr val="dk1">
-                    <a:alpha val="40000"/>
-                  </a:schemeClr>
-                </a:outerShdw>
-              </a:effectLst>
-              <a:latin typeface="Kozuka Gothic Pr6N L" panose="020B0200000000000000" pitchFamily="34" charset="-128"/>
-              <a:ea typeface="Kozuka Gothic Pr6N L" panose="020B0200000000000000" pitchFamily="34" charset="-128"/>
-              <a:cs typeface="Times New Roman" panose="02020603050405020304" pitchFamily="18" charset="0"/>
-            </a:endParaRPr>
           </a:p>
         </p:txBody>
       </p:sp>
@@ -13439,7 +13278,7 @@
           <a:lstStyle/>
           <a:p>
             <a:r>
-              <a:rPr lang="en-US" sz="2400" dirty="0" smtClean="0">
+              <a:rPr lang="en-US" sz="2400" dirty="0">
                 <a:ln w="0"/>
                 <a:solidFill>
                   <a:schemeClr val="tx1"/>
@@ -13483,7 +13322,7 @@
         <p:spPr>
           <a:xfrm>
             <a:off x="1932241" y="3482245"/>
-            <a:ext cx="3320602" cy="584775"/>
+            <a:ext cx="4431042" cy="584775"/>
           </a:xfrm>
           <a:prstGeom prst="rect">
             <a:avLst/>
@@ -13497,7 +13336,7 @@
           <a:lstStyle/>
           <a:p>
             <a:r>
-              <a:rPr lang="fr-FR" sz="3200" dirty="0" smtClean="0">
+              <a:rPr lang="fr-FR" sz="3200" dirty="0">
                 <a:ln w="0"/>
                 <a:solidFill>
                   <a:schemeClr val="tx1">
@@ -13518,25 +13357,6 @@
               </a:rPr>
               <a:t>Non-redondance</a:t>
             </a:r>
-            <a:endParaRPr lang="fr-FR" sz="3200" dirty="0">
-              <a:ln w="0"/>
-              <a:solidFill>
-                <a:schemeClr val="tx1">
-                  <a:lumMod val="75000"/>
-                  <a:lumOff val="25000"/>
-                </a:schemeClr>
-              </a:solidFill>
-              <a:effectLst>
-                <a:outerShdw blurRad="38100" dist="19050" dir="2700000" algn="tl" rotWithShape="0">
-                  <a:schemeClr val="dk1">
-                    <a:alpha val="40000"/>
-                  </a:schemeClr>
-                </a:outerShdw>
-              </a:effectLst>
-              <a:latin typeface="Kozuka Gothic Pr6N L" panose="020B0200000000000000" pitchFamily="34" charset="-128"/>
-              <a:ea typeface="Kozuka Gothic Pr6N L" panose="020B0200000000000000" pitchFamily="34" charset="-128"/>
-              <a:cs typeface="Times New Roman" panose="02020603050405020304" pitchFamily="18" charset="0"/>
-            </a:endParaRPr>
           </a:p>
         </p:txBody>
       </p:sp>
@@ -13563,7 +13383,7 @@
           <a:lstStyle/>
           <a:p>
             <a:r>
-              <a:rPr lang="fr-FR" sz="3200" dirty="0" smtClean="0">
+              <a:rPr lang="fr-FR" sz="3200" dirty="0">
                 <a:ln w="0"/>
                 <a:solidFill>
                   <a:schemeClr val="tx1">
@@ -13584,25 +13404,6 @@
               </a:rPr>
               <a:t>Cohérence</a:t>
             </a:r>
-            <a:endParaRPr lang="fr-FR" sz="3200" dirty="0">
-              <a:ln w="0"/>
-              <a:solidFill>
-                <a:schemeClr val="tx1">
-                  <a:lumMod val="75000"/>
-                  <a:lumOff val="25000"/>
-                </a:schemeClr>
-              </a:solidFill>
-              <a:effectLst>
-                <a:outerShdw blurRad="38100" dist="19050" dir="2700000" algn="tl" rotWithShape="0">
-                  <a:schemeClr val="dk1">
-                    <a:alpha val="40000"/>
-                  </a:schemeClr>
-                </a:outerShdw>
-              </a:effectLst>
-              <a:latin typeface="Kozuka Gothic Pr6N L" panose="020B0200000000000000" pitchFamily="34" charset="-128"/>
-              <a:ea typeface="Kozuka Gothic Pr6N L" panose="020B0200000000000000" pitchFamily="34" charset="-128"/>
-              <a:cs typeface="Times New Roman" panose="02020603050405020304" pitchFamily="18" charset="0"/>
-            </a:endParaRPr>
           </a:p>
         </p:txBody>
       </p:sp>
@@ -13629,7 +13430,7 @@
           <a:lstStyle/>
           <a:p>
             <a:r>
-              <a:rPr lang="fr-FR" sz="3200" dirty="0" smtClean="0">
+              <a:rPr lang="fr-FR" sz="3200" dirty="0">
                 <a:ln w="0"/>
                 <a:solidFill>
                   <a:schemeClr val="tx1">
@@ -13798,7 +13599,7 @@
         <p:spPr>
           <a:xfrm>
             <a:off x="1865879" y="6858000"/>
-            <a:ext cx="1818661" cy="523220"/>
+            <a:ext cx="3101906" cy="523220"/>
           </a:xfrm>
           <a:prstGeom prst="rect">
             <a:avLst/>
@@ -13812,7 +13613,7 @@
           <a:lstStyle/>
           <a:p>
             <a:r>
-              <a:rPr lang="fr-FR" sz="2800" dirty="0" smtClean="0">
+              <a:rPr lang="fr-FR" sz="2800" dirty="0">
                 <a:ln w="0"/>
                 <a:solidFill>
                   <a:schemeClr val="bg2">
@@ -13831,23 +13632,6 @@
               </a:rPr>
               <a:t>Scalabilité</a:t>
             </a:r>
-            <a:endParaRPr lang="fr-FR" sz="2800" dirty="0">
-              <a:ln w="0"/>
-              <a:solidFill>
-                <a:schemeClr val="bg2">
-                  <a:lumMod val="25000"/>
-                </a:schemeClr>
-              </a:solidFill>
-              <a:effectLst>
-                <a:outerShdw blurRad="38100" dist="19050" dir="2700000" algn="tl" rotWithShape="0">
-                  <a:schemeClr val="dk1">
-                    <a:alpha val="40000"/>
-                  </a:schemeClr>
-                </a:outerShdw>
-              </a:effectLst>
-              <a:latin typeface="Kozuka Gothic Pr6N L" panose="020B0200000000000000" pitchFamily="34" charset="-128"/>
-              <a:ea typeface="Kozuka Gothic Pr6N L" panose="020B0200000000000000" pitchFamily="34" charset="-128"/>
-            </a:endParaRPr>
           </a:p>
         </p:txBody>
       </p:sp>
@@ -13860,7 +13644,7 @@
         <p:spPr>
           <a:xfrm>
             <a:off x="1865880" y="7371212"/>
-            <a:ext cx="2205709" cy="523220"/>
+            <a:ext cx="2788007" cy="523220"/>
           </a:xfrm>
           <a:prstGeom prst="rect">
             <a:avLst/>
@@ -13874,7 +13658,7 @@
           <a:lstStyle/>
           <a:p>
             <a:r>
-              <a:rPr lang="fr-FR" sz="2800" dirty="0" smtClean="0">
+              <a:rPr lang="fr-FR" sz="2800" dirty="0">
                 <a:ln w="0"/>
                 <a:solidFill>
                   <a:schemeClr val="bg2">
@@ -13893,23 +13677,6 @@
               </a:rPr>
               <a:t>Redondance</a:t>
             </a:r>
-            <a:endParaRPr lang="fr-FR" sz="2800" dirty="0">
-              <a:ln w="0"/>
-              <a:solidFill>
-                <a:schemeClr val="bg2">
-                  <a:lumMod val="25000"/>
-                </a:schemeClr>
-              </a:solidFill>
-              <a:effectLst>
-                <a:outerShdw blurRad="38100" dist="19050" dir="2700000" algn="tl" rotWithShape="0">
-                  <a:schemeClr val="dk1">
-                    <a:alpha val="40000"/>
-                  </a:schemeClr>
-                </a:outerShdw>
-              </a:effectLst>
-              <a:latin typeface="Kozuka Gothic Pr6N L" panose="020B0200000000000000" pitchFamily="34" charset="-128"/>
-              <a:ea typeface="Kozuka Gothic Pr6N L" panose="020B0200000000000000" pitchFamily="34" charset="-128"/>
-            </a:endParaRPr>
           </a:p>
         </p:txBody>
       </p:sp>
@@ -13921,8 +13688,8 @@
         </p:nvSpPr>
         <p:spPr>
           <a:xfrm>
-            <a:off x="1865879" y="7465598"/>
-            <a:ext cx="2931914" cy="523220"/>
+            <a:off x="1865878" y="7465598"/>
+            <a:ext cx="3757289" cy="523220"/>
           </a:xfrm>
           <a:prstGeom prst="rect">
             <a:avLst/>
@@ -13936,7 +13703,7 @@
           <a:lstStyle/>
           <a:p>
             <a:r>
-              <a:rPr lang="fr-FR" sz="2800" dirty="0" smtClean="0">
+              <a:rPr lang="fr-FR" sz="2800" dirty="0">
                 <a:ln w="0"/>
                 <a:solidFill>
                   <a:schemeClr val="bg2">
@@ -13955,23 +13722,6 @@
               </a:rPr>
               <a:t>Synchronisation</a:t>
             </a:r>
-            <a:endParaRPr lang="fr-FR" sz="2800" dirty="0">
-              <a:ln w="0"/>
-              <a:solidFill>
-                <a:schemeClr val="bg2">
-                  <a:lumMod val="25000"/>
-                </a:schemeClr>
-              </a:solidFill>
-              <a:effectLst>
-                <a:outerShdw blurRad="38100" dist="19050" dir="2700000" algn="tl" rotWithShape="0">
-                  <a:schemeClr val="dk1">
-                    <a:alpha val="40000"/>
-                  </a:schemeClr>
-                </a:outerShdw>
-              </a:effectLst>
-              <a:latin typeface="Kozuka Gothic Pr6N L" panose="020B0200000000000000" pitchFamily="34" charset="-128"/>
-              <a:ea typeface="Kozuka Gothic Pr6N L" panose="020B0200000000000000" pitchFamily="34" charset="-128"/>
-            </a:endParaRPr>
           </a:p>
         </p:txBody>
       </p:sp>
@@ -13984,7 +13734,7 @@
         <p:spPr>
           <a:xfrm>
             <a:off x="1914254" y="7727208"/>
-            <a:ext cx="2205709" cy="523220"/>
+            <a:ext cx="3192319" cy="523220"/>
           </a:xfrm>
           <a:prstGeom prst="rect">
             <a:avLst/>
@@ -13998,7 +13748,7 @@
           <a:lstStyle/>
           <a:p>
             <a:r>
-              <a:rPr lang="fr-FR" sz="2800" dirty="0" smtClean="0">
+              <a:rPr lang="fr-FR" sz="2800" dirty="0">
                 <a:ln w="0"/>
                 <a:solidFill>
                   <a:schemeClr val="bg2">
@@ -14017,23 +13767,6 @@
               </a:rPr>
               <a:t>Rapports</a:t>
             </a:r>
-            <a:endParaRPr lang="fr-FR" sz="2800" dirty="0">
-              <a:ln w="0"/>
-              <a:solidFill>
-                <a:schemeClr val="bg2">
-                  <a:lumMod val="25000"/>
-                </a:schemeClr>
-              </a:solidFill>
-              <a:effectLst>
-                <a:outerShdw blurRad="38100" dist="19050" dir="2700000" algn="tl" rotWithShape="0">
-                  <a:schemeClr val="dk1">
-                    <a:alpha val="40000"/>
-                  </a:schemeClr>
-                </a:outerShdw>
-              </a:effectLst>
-              <a:latin typeface="Kozuka Gothic Pr6N L" panose="020B0200000000000000" pitchFamily="34" charset="-128"/>
-              <a:ea typeface="Kozuka Gothic Pr6N L" panose="020B0200000000000000" pitchFamily="34" charset="-128"/>
-            </a:endParaRPr>
           </a:p>
         </p:txBody>
       </p:sp>
@@ -14047,13 +13780,13 @@
   <p:clrMapOvr>
     <a:masterClrMapping/>
   </p:clrMapOvr>
-  <mc:AlternateContent xmlns:mc="http://schemas.openxmlformats.org/markup-compatibility/2006">
-    <mc:Choice xmlns:p14="http://schemas.microsoft.com/office/powerpoint/2010/main" Requires="p14">
+  <mc:AlternateContent xmlns:mc="http://schemas.openxmlformats.org/markup-compatibility/2006" xmlns:p14="http://schemas.microsoft.com/office/powerpoint/2010/main">
+    <mc:Choice Requires="p14">
       <p:transition spd="slow" p14:dur="1500">
         <p:push dir="u"/>
       </p:transition>
     </mc:Choice>
-    <mc:Fallback>
+    <mc:Fallback xmlns="">
       <p:transition spd="slow">
         <p:push dir="u"/>
       </p:transition>
@@ -15947,7 +15680,7 @@
           <a:lstStyle/>
           <a:p>
             <a:r>
-              <a:rPr lang="fr-FR" sz="6000" dirty="0" smtClean="0">
+              <a:rPr lang="fr-FR" sz="6000" dirty="0">
                 <a:solidFill>
                   <a:schemeClr val="bg1"/>
                 </a:solidFill>
@@ -15955,12 +15688,6 @@
               </a:rPr>
               <a:t>Outils de développement</a:t>
             </a:r>
-            <a:endParaRPr lang="fr-FR" sz="6000" dirty="0">
-              <a:solidFill>
-                <a:schemeClr val="bg1"/>
-              </a:solidFill>
-              <a:latin typeface="Century Gothic" panose="020B0502020202020204" pitchFamily="34" charset="0"/>
-            </a:endParaRPr>
           </a:p>
         </p:txBody>
       </p:sp>
@@ -16094,13 +15821,13 @@
   <p:clrMapOvr>
     <a:masterClrMapping/>
   </p:clrMapOvr>
-  <mc:AlternateContent xmlns:mc="http://schemas.openxmlformats.org/markup-compatibility/2006">
-    <mc:Choice xmlns:p14="http://schemas.microsoft.com/office/powerpoint/2010/main" Requires="p14">
+  <mc:AlternateContent xmlns:mc="http://schemas.openxmlformats.org/markup-compatibility/2006" xmlns:p14="http://schemas.microsoft.com/office/powerpoint/2010/main">
+    <mc:Choice Requires="p14">
       <p:transition spd="slow" p14:dur="2000">
         <p14:prism isContent="1"/>
       </p:transition>
     </mc:Choice>
-    <mc:Fallback>
+    <mc:Fallback xmlns="">
       <p:transition spd="slow">
         <p:fade/>
       </p:transition>
@@ -16666,7 +16393,7 @@
           <a:lstStyle/>
           <a:p>
             <a:r>
-              <a:rPr lang="en-US" sz="2400" dirty="0" smtClean="0">
+              <a:rPr lang="en-US" sz="2400" dirty="0">
                 <a:latin typeface="Times New Roman" panose="02020603050405020304" pitchFamily="18" charset="0"/>
                 <a:cs typeface="Times New Roman" panose="02020603050405020304" pitchFamily="18" charset="0"/>
               </a:rPr>
@@ -16702,16 +16429,12 @@
           <a:lstStyle/>
           <a:p>
             <a:r>
-              <a:rPr lang="fr-FR" sz="2400" dirty="0" smtClean="0">
+              <a:rPr lang="fr-FR" sz="2400" dirty="0">
                 <a:latin typeface="Times New Roman" panose="02020603050405020304" pitchFamily="18" charset="0"/>
                 <a:cs typeface="Times New Roman" panose="02020603050405020304" pitchFamily="18" charset="0"/>
               </a:rPr>
               <a:t>1970 !!!</a:t>
             </a:r>
-            <a:endParaRPr lang="fr-FR" sz="2400" dirty="0">
-              <a:latin typeface="Times New Roman" panose="02020603050405020304" pitchFamily="18" charset="0"/>
-              <a:cs typeface="Times New Roman" panose="02020603050405020304" pitchFamily="18" charset="0"/>
-            </a:endParaRPr>
           </a:p>
         </p:txBody>
       </p:sp>
@@ -16798,7 +16521,7 @@
           <a:lstStyle/>
           <a:p>
             <a:r>
-              <a:rPr lang="en-US" sz="2800" dirty="0" smtClean="0">
+              <a:rPr lang="en-US" sz="2800" dirty="0">
                 <a:ln w="0"/>
                 <a:effectLst>
                   <a:outerShdw blurRad="38100" dist="19050" dir="2700000" algn="tl" rotWithShape="0">
@@ -16848,7 +16571,7 @@
           <a:lstStyle/>
           <a:p>
             <a:r>
-              <a:rPr lang="en-US" sz="2800" dirty="0" smtClean="0">
+              <a:rPr lang="en-US" sz="2800" dirty="0">
                 <a:ln w="0"/>
                 <a:effectLst>
                   <a:outerShdw blurRad="38100" dist="19050" dir="2700000" algn="tl" rotWithShape="0">
@@ -16898,7 +16621,7 @@
           <a:lstStyle/>
           <a:p>
             <a:r>
-              <a:rPr lang="en-US" sz="2800" dirty="0" smtClean="0">
+              <a:rPr lang="en-US" sz="2800" dirty="0">
                 <a:ln w="0"/>
                 <a:effectLst>
                   <a:outerShdw blurRad="38100" dist="19050" dir="2700000" algn="tl" rotWithShape="0">
@@ -16948,7 +16671,7 @@
           <a:lstStyle/>
           <a:p>
             <a:r>
-              <a:rPr lang="en-US" sz="2800" dirty="0" smtClean="0">
+              <a:rPr lang="en-US" sz="2800" dirty="0">
                 <a:ln w="0"/>
                 <a:effectLst>
                   <a:outerShdw blurRad="38100" dist="19050" dir="2700000" algn="tl" rotWithShape="0">
@@ -16998,7 +16721,7 @@
           <a:lstStyle/>
           <a:p>
             <a:r>
-              <a:rPr lang="en-US" sz="2800" dirty="0" smtClean="0">
+              <a:rPr lang="en-US" sz="2800" dirty="0">
                 <a:ln w="0"/>
                 <a:effectLst>
                   <a:outerShdw blurRad="38100" dist="19050" dir="2700000" algn="tl" rotWithShape="0">
@@ -17072,7 +16795,7 @@
           <a:p>
             <a:pPr algn="ctr"/>
             <a:r>
-              <a:rPr lang="en-US" sz="2800" b="1" dirty="0" smtClean="0">
+              <a:rPr lang="en-US" sz="2800" b="1" dirty="0">
                 <a:ln/>
                 <a:solidFill>
                   <a:schemeClr val="bg1"/>
@@ -17136,7 +16859,7 @@
           <a:p>
             <a:pPr algn="ctr"/>
             <a:r>
-              <a:rPr lang="en-US" sz="2800" b="1" dirty="0" smtClean="0">
+              <a:rPr lang="en-US" sz="2800" b="1" dirty="0">
                 <a:ln/>
                 <a:solidFill>
                   <a:schemeClr val="bg1"/>
@@ -17200,7 +16923,7 @@
           <a:p>
             <a:pPr algn="ctr"/>
             <a:r>
-              <a:rPr lang="en-US" sz="2800" b="1" dirty="0" smtClean="0">
+              <a:rPr lang="en-US" sz="2800" b="1" dirty="0">
                 <a:ln/>
                 <a:solidFill>
                   <a:schemeClr val="bg1"/>
@@ -17264,7 +16987,7 @@
           <a:p>
             <a:pPr algn="ctr"/>
             <a:r>
-              <a:rPr lang="en-US" sz="2800" b="1" dirty="0" smtClean="0">
+              <a:rPr lang="en-US" sz="2800" b="1" dirty="0">
                 <a:ln/>
                 <a:solidFill>
                   <a:schemeClr val="bg1"/>
@@ -17328,7 +17051,7 @@
           <a:p>
             <a:pPr algn="ctr"/>
             <a:r>
-              <a:rPr lang="en-US" sz="2800" b="1" dirty="0" smtClean="0">
+              <a:rPr lang="en-US" sz="2800" b="1" dirty="0">
                 <a:ln/>
                 <a:solidFill>
                   <a:schemeClr val="bg1"/>
@@ -17447,7 +17170,7 @@
           <a:lstStyle/>
           <a:p>
             <a:r>
-              <a:rPr lang="fr-FR" sz="4000" dirty="0" smtClean="0">
+              <a:rPr lang="fr-FR" sz="4000" dirty="0">
                 <a:ln w="0"/>
                 <a:solidFill>
                   <a:schemeClr val="bg1"/>
@@ -17463,20 +17186,6 @@
               </a:rPr>
               <a:t>Les principes S.O.L.I.D</a:t>
             </a:r>
-            <a:endParaRPr lang="fr-FR" sz="4000" dirty="0">
-              <a:ln w="0"/>
-              <a:solidFill>
-                <a:schemeClr val="bg1"/>
-              </a:solidFill>
-              <a:effectLst>
-                <a:outerShdw blurRad="38100" dist="19050" dir="2700000" algn="tl" rotWithShape="0">
-                  <a:schemeClr val="dk1">
-                    <a:alpha val="40000"/>
-                  </a:schemeClr>
-                </a:outerShdw>
-              </a:effectLst>
-              <a:latin typeface="Century Gothic" panose="020B0502020202020204" pitchFamily="34" charset="0"/>
-            </a:endParaRPr>
           </a:p>
         </p:txBody>
       </p:sp>
@@ -17490,13 +17199,13 @@
   <p:clrMapOvr>
     <a:masterClrMapping/>
   </p:clrMapOvr>
-  <mc:AlternateContent xmlns:mc="http://schemas.openxmlformats.org/markup-compatibility/2006">
-    <mc:Choice xmlns:p14="http://schemas.microsoft.com/office/powerpoint/2010/main" Requires="p14">
+  <mc:AlternateContent xmlns:mc="http://schemas.openxmlformats.org/markup-compatibility/2006" xmlns:p14="http://schemas.microsoft.com/office/powerpoint/2010/main">
+    <mc:Choice Requires="p14">
       <p:transition spd="slow" p14:dur="1600">
         <p14:prism dir="d" isInverted="1"/>
       </p:transition>
     </mc:Choice>
-    <mc:Fallback>
+    <mc:Fallback xmlns="">
       <p:transition spd="slow">
         <p:fade/>
       </p:transition>
@@ -18810,7 +18519,7 @@
           <a:lstStyle/>
           <a:p>
             <a:r>
-              <a:rPr lang="en-US" sz="2800" dirty="0" smtClean="0">
+              <a:rPr lang="en-US" sz="2800" dirty="0">
                 <a:solidFill>
                   <a:schemeClr val="bg1"/>
                 </a:solidFill>
@@ -18948,7 +18657,7 @@
           <a:lstStyle/>
           <a:p>
             <a:r>
-              <a:rPr lang="en-US" sz="2800" dirty="0" smtClean="0">
+              <a:rPr lang="en-US" sz="2800" dirty="0">
                 <a:solidFill>
                   <a:schemeClr val="bg1">
                     <a:lumMod val="95000"/>
@@ -18990,7 +18699,7 @@
           <a:lstStyle/>
           <a:p>
             <a:r>
-              <a:rPr lang="en-US" sz="6000" dirty="0" smtClean="0">
+              <a:rPr lang="en-US" sz="6000" dirty="0">
                 <a:solidFill>
                   <a:schemeClr val="bg1"/>
                 </a:solidFill>
@@ -19028,7 +18737,7 @@
           <a:lstStyle/>
           <a:p>
             <a:r>
-              <a:rPr lang="en-US" sz="3600" dirty="0" smtClean="0">
+              <a:rPr lang="en-US" sz="3600" dirty="0">
                 <a:solidFill>
                   <a:schemeClr val="bg1"/>
                 </a:solidFill>
@@ -19066,7 +18775,7 @@
           <a:lstStyle/>
           <a:p>
             <a:r>
-              <a:rPr lang="en-US" sz="3600" dirty="0" smtClean="0">
+              <a:rPr lang="en-US" sz="3600" dirty="0">
                 <a:solidFill>
                   <a:schemeClr val="bg1"/>
                 </a:solidFill>
@@ -19104,7 +18813,7 @@
           <a:lstStyle/>
           <a:p>
             <a:r>
-              <a:rPr lang="en-US" sz="3600" dirty="0" smtClean="0">
+              <a:rPr lang="en-US" sz="3600" dirty="0">
                 <a:solidFill>
                   <a:schemeClr val="bg1"/>
                 </a:solidFill>

</xml_diff>